<commit_message>
fix doc and presentation
</commit_message>
<xml_diff>
--- a/presentazione/Presentazione_Progetti_di_Dipl.pptx
+++ b/presentazione/Presentazione_Progetti_di_Dipl.pptx
@@ -5,22 +5,23 @@
     <p:sldMasterId id="2147484139" r:id="rId1"/>
   </p:sldMasterIdLst>
   <p:notesMasterIdLst>
-    <p:notesMasterId r:id="rId12"/>
+    <p:notesMasterId r:id="rId13"/>
   </p:notesMasterIdLst>
   <p:handoutMasterIdLst>
-    <p:handoutMasterId r:id="rId13"/>
+    <p:handoutMasterId r:id="rId14"/>
   </p:handoutMasterIdLst>
   <p:sldIdLst>
     <p:sldId id="268" r:id="rId2"/>
     <p:sldId id="266" r:id="rId3"/>
     <p:sldId id="271" r:id="rId4"/>
-    <p:sldId id="272" r:id="rId5"/>
+    <p:sldId id="280" r:id="rId5"/>
     <p:sldId id="275" r:id="rId6"/>
     <p:sldId id="276" r:id="rId7"/>
     <p:sldId id="277" r:id="rId8"/>
     <p:sldId id="278" r:id="rId9"/>
     <p:sldId id="279" r:id="rId10"/>
-    <p:sldId id="269" r:id="rId11"/>
+    <p:sldId id="281" r:id="rId11"/>
+    <p:sldId id="269" r:id="rId12"/>
   </p:sldIdLst>
   <p:sldSz cx="9144000" cy="6858000" type="screen4x3"/>
   <p:notesSz cx="6858000" cy="9144000"/>
@@ -265,7 +266,7 @@
             <a:fld id="{EC9388A7-5429-7442-BD81-798B3F4B5BE0}" type="datetime1">
               <a:rPr lang="it-IT"/>
               <a:pPr/>
-              <a:t>03/05/19</a:t>
+              <a:t>13/05/19</a:t>
             </a:fld>
             <a:endParaRPr lang="it-IT"/>
           </a:p>
@@ -516,14 +517,14 @@
           </a:ln>
           <a:extLst>
             <a:ext uri="{909E8E84-426E-40dd-AFC4-6F175D3DCCD1}">
-              <a14:hiddenFill xmlns:a14="http://schemas.microsoft.com/office/drawing/2010/main" xmlns="">
+              <a14:hiddenFill xmlns="" xmlns:a14="http://schemas.microsoft.com/office/drawing/2010/main">
                 <a:solidFill>
                   <a:srgbClr val="FFFFFF"/>
                 </a:solidFill>
               </a14:hiddenFill>
             </a:ext>
             <a:ext uri="{FAA26D3D-D897-4be2-8F04-BA451C77F1D7}">
-              <ma14:placeholderFlag xmlns:ma14="http://schemas.microsoft.com/office/mac/drawingml/2011/main" xmlns="" val="1"/>
+              <ma14:placeholderFlag xmlns="" xmlns:ma14="http://schemas.microsoft.com/office/mac/drawingml/2011/main" val="1"/>
             </a:ext>
           </a:extLst>
         </p:spPr>
@@ -981,7 +982,7 @@
             <a:fld id="{F6425F76-5FCB-3E42-9F4B-C72054CFC5AB}" type="slidenum">
               <a:rPr lang="it-IT" smtClean="0"/>
               <a:pPr/>
-              <a:t>6</a:t>
+              <a:t>4</a:t>
             </a:fld>
             <a:endParaRPr lang="it-IT"/>
           </a:p>
@@ -990,7 +991,7 @@
     </p:spTree>
     <p:extLst>
       <p:ext uri="{BB962C8B-B14F-4D97-AF65-F5344CB8AC3E}">
-        <p14:creationId xmlns:p14="http://schemas.microsoft.com/office/powerpoint/2010/main" val="2909945367"/>
+        <p14:creationId xmlns:p14="http://schemas.microsoft.com/office/powerpoint/2010/main" val="3535463782"/>
       </p:ext>
     </p:extLst>
   </p:cSld>
@@ -1066,7 +1067,7 @@
             <a:fld id="{F6425F76-5FCB-3E42-9F4B-C72054CFC5AB}" type="slidenum">
               <a:rPr lang="it-IT" smtClean="0"/>
               <a:pPr/>
-              <a:t>7</a:t>
+              <a:t>6</a:t>
             </a:fld>
             <a:endParaRPr lang="it-IT"/>
           </a:p>
@@ -1075,7 +1076,7 @@
     </p:spTree>
     <p:extLst>
       <p:ext uri="{BB962C8B-B14F-4D97-AF65-F5344CB8AC3E}">
-        <p14:creationId xmlns:p14="http://schemas.microsoft.com/office/powerpoint/2010/main" val="3352507480"/>
+        <p14:creationId xmlns:p14="http://schemas.microsoft.com/office/powerpoint/2010/main" val="2909945367"/>
       </p:ext>
     </p:extLst>
   </p:cSld>
@@ -1151,7 +1152,7 @@
             <a:fld id="{F6425F76-5FCB-3E42-9F4B-C72054CFC5AB}" type="slidenum">
               <a:rPr lang="it-IT" smtClean="0"/>
               <a:pPr/>
-              <a:t>8</a:t>
+              <a:t>7</a:t>
             </a:fld>
             <a:endParaRPr lang="it-IT"/>
           </a:p>
@@ -1160,7 +1161,7 @@
     </p:spTree>
     <p:extLst>
       <p:ext uri="{BB962C8B-B14F-4D97-AF65-F5344CB8AC3E}">
-        <p14:creationId xmlns:p14="http://schemas.microsoft.com/office/powerpoint/2010/main" val="1387461529"/>
+        <p14:creationId xmlns:p14="http://schemas.microsoft.com/office/powerpoint/2010/main" val="3352507480"/>
       </p:ext>
     </p:extLst>
   </p:cSld>
@@ -1236,6 +1237,91 @@
             <a:fld id="{F6425F76-5FCB-3E42-9F4B-C72054CFC5AB}" type="slidenum">
               <a:rPr lang="it-IT" smtClean="0"/>
               <a:pPr/>
+              <a:t>8</a:t>
+            </a:fld>
+            <a:endParaRPr lang="it-IT"/>
+          </a:p>
+        </p:txBody>
+      </p:sp>
+    </p:spTree>
+    <p:extLst>
+      <p:ext uri="{BB962C8B-B14F-4D97-AF65-F5344CB8AC3E}">
+        <p14:creationId xmlns:p14="http://schemas.microsoft.com/office/powerpoint/2010/main" val="1387461529"/>
+      </p:ext>
+    </p:extLst>
+  </p:cSld>
+  <p:clrMapOvr>
+    <a:masterClrMapping/>
+  </p:clrMapOvr>
+</p:notes>
+</file>
+
+<file path=ppt/notesSlides/notesSlide6.xml><?xml version="1.0" encoding="utf-8"?>
+<p:notes xmlns:a="http://schemas.openxmlformats.org/drawingml/2006/main" xmlns:r="http://schemas.openxmlformats.org/officeDocument/2006/relationships" xmlns:p="http://schemas.openxmlformats.org/presentationml/2006/main">
+  <p:cSld>
+    <p:spTree>
+      <p:nvGrpSpPr>
+        <p:cNvPr id="1" name=""/>
+        <p:cNvGrpSpPr/>
+        <p:nvPr/>
+      </p:nvGrpSpPr>
+      <p:grpSpPr>
+        <a:xfrm>
+          <a:off x="0" y="0"/>
+          <a:ext cx="0" cy="0"/>
+          <a:chOff x="0" y="0"/>
+          <a:chExt cx="0" cy="0"/>
+        </a:xfrm>
+      </p:grpSpPr>
+      <p:sp>
+        <p:nvSpPr>
+          <p:cNvPr id="2" name="Segnaposto immagine diapositiva 1"/>
+          <p:cNvSpPr>
+            <a:spLocks noGrp="1" noRot="1" noChangeAspect="1"/>
+          </p:cNvSpPr>
+          <p:nvPr>
+            <p:ph type="sldImg"/>
+          </p:nvPr>
+        </p:nvSpPr>
+        <p:spPr/>
+      </p:sp>
+      <p:sp>
+        <p:nvSpPr>
+          <p:cNvPr id="3" name="Segnaposto note 2"/>
+          <p:cNvSpPr>
+            <a:spLocks noGrp="1"/>
+          </p:cNvSpPr>
+          <p:nvPr>
+            <p:ph type="body" idx="1"/>
+          </p:nvPr>
+        </p:nvSpPr>
+        <p:spPr/>
+        <p:txBody>
+          <a:bodyPr/>
+          <a:lstStyle/>
+          <a:p>
+            <a:endParaRPr lang="it-CH" dirty="0"/>
+          </a:p>
+        </p:txBody>
+      </p:sp>
+      <p:sp>
+        <p:nvSpPr>
+          <p:cNvPr id="4" name="Segnaposto numero diapositiva 3"/>
+          <p:cNvSpPr>
+            <a:spLocks noGrp="1"/>
+          </p:cNvSpPr>
+          <p:nvPr>
+            <p:ph type="sldNum" sz="quarter" idx="5"/>
+          </p:nvPr>
+        </p:nvSpPr>
+        <p:spPr/>
+        <p:txBody>
+          <a:bodyPr/>
+          <a:lstStyle/>
+          <a:p>
+            <a:fld id="{F6425F76-5FCB-3E42-9F4B-C72054CFC5AB}" type="slidenum">
+              <a:rPr lang="it-IT" smtClean="0"/>
+              <a:pPr/>
               <a:t>9</a:t>
             </a:fld>
             <a:endParaRPr lang="it-IT"/>
@@ -1246,6 +1332,91 @@
     <p:extLst>
       <p:ext uri="{BB962C8B-B14F-4D97-AF65-F5344CB8AC3E}">
         <p14:creationId xmlns:p14="http://schemas.microsoft.com/office/powerpoint/2010/main" val="2353701832"/>
+      </p:ext>
+    </p:extLst>
+  </p:cSld>
+  <p:clrMapOvr>
+    <a:masterClrMapping/>
+  </p:clrMapOvr>
+</p:notes>
+</file>
+
+<file path=ppt/notesSlides/notesSlide7.xml><?xml version="1.0" encoding="utf-8"?>
+<p:notes xmlns:a="http://schemas.openxmlformats.org/drawingml/2006/main" xmlns:r="http://schemas.openxmlformats.org/officeDocument/2006/relationships" xmlns:p="http://schemas.openxmlformats.org/presentationml/2006/main">
+  <p:cSld>
+    <p:spTree>
+      <p:nvGrpSpPr>
+        <p:cNvPr id="1" name=""/>
+        <p:cNvGrpSpPr/>
+        <p:nvPr/>
+      </p:nvGrpSpPr>
+      <p:grpSpPr>
+        <a:xfrm>
+          <a:off x="0" y="0"/>
+          <a:ext cx="0" cy="0"/>
+          <a:chOff x="0" y="0"/>
+          <a:chExt cx="0" cy="0"/>
+        </a:xfrm>
+      </p:grpSpPr>
+      <p:sp>
+        <p:nvSpPr>
+          <p:cNvPr id="2" name="Segnaposto immagine diapositiva 1"/>
+          <p:cNvSpPr>
+            <a:spLocks noGrp="1" noRot="1" noChangeAspect="1"/>
+          </p:cNvSpPr>
+          <p:nvPr>
+            <p:ph type="sldImg"/>
+          </p:nvPr>
+        </p:nvSpPr>
+        <p:spPr/>
+      </p:sp>
+      <p:sp>
+        <p:nvSpPr>
+          <p:cNvPr id="3" name="Segnaposto note 2"/>
+          <p:cNvSpPr>
+            <a:spLocks noGrp="1"/>
+          </p:cNvSpPr>
+          <p:nvPr>
+            <p:ph type="body" idx="1"/>
+          </p:nvPr>
+        </p:nvSpPr>
+        <p:spPr/>
+        <p:txBody>
+          <a:bodyPr/>
+          <a:lstStyle/>
+          <a:p>
+            <a:endParaRPr lang="it-CH" dirty="0"/>
+          </a:p>
+        </p:txBody>
+      </p:sp>
+      <p:sp>
+        <p:nvSpPr>
+          <p:cNvPr id="4" name="Segnaposto numero diapositiva 3"/>
+          <p:cNvSpPr>
+            <a:spLocks noGrp="1"/>
+          </p:cNvSpPr>
+          <p:nvPr>
+            <p:ph type="sldNum" sz="quarter" idx="5"/>
+          </p:nvPr>
+        </p:nvSpPr>
+        <p:spPr/>
+        <p:txBody>
+          <a:bodyPr/>
+          <a:lstStyle/>
+          <a:p>
+            <a:fld id="{F6425F76-5FCB-3E42-9F4B-C72054CFC5AB}" type="slidenum">
+              <a:rPr lang="it-IT" smtClean="0"/>
+              <a:pPr/>
+              <a:t>10</a:t>
+            </a:fld>
+            <a:endParaRPr lang="it-IT"/>
+          </a:p>
+        </p:txBody>
+      </p:sp>
+    </p:spTree>
+    <p:extLst>
+      <p:ext uri="{BB962C8B-B14F-4D97-AF65-F5344CB8AC3E}">
+        <p14:creationId xmlns:p14="http://schemas.microsoft.com/office/powerpoint/2010/main" val="4253626677"/>
       </p:ext>
     </p:extLst>
   </p:cSld>
@@ -5590,6 +5761,226 @@
       </p:grpSpPr>
       <p:sp>
         <p:nvSpPr>
+          <p:cNvPr id="2" name="Segnaposto testo 1"/>
+          <p:cNvSpPr>
+            <a:spLocks noGrp="1"/>
+          </p:cNvSpPr>
+          <p:nvPr>
+            <p:ph type="body" sz="quarter" idx="13"/>
+          </p:nvPr>
+        </p:nvSpPr>
+        <p:spPr>
+          <a:xfrm>
+            <a:off x="323528" y="2314972"/>
+            <a:ext cx="8136904" cy="4248472"/>
+          </a:xfrm>
+        </p:spPr>
+        <p:txBody>
+          <a:bodyPr/>
+          <a:lstStyle/>
+          <a:p>
+            <a:pPr marL="285750" indent="-285750">
+              <a:buFont typeface="Arial" panose="020B0604020202020204" pitchFamily="34" charset="0"/>
+              <a:buChar char="•"/>
+            </a:pPr>
+            <a:r>
+              <a:rPr lang="it-IT" sz="1800" dirty="0"/>
+              <a:t>Approfondite tematiche legate a JavaScript</a:t>
+            </a:r>
+          </a:p>
+          <a:p>
+            <a:endParaRPr lang="it-IT" sz="1800" dirty="0"/>
+          </a:p>
+          <a:p>
+            <a:pPr marL="285750" indent="-285750">
+              <a:buFont typeface="Arial" panose="020B0604020202020204" pitchFamily="34" charset="0"/>
+              <a:buChar char="•"/>
+            </a:pPr>
+            <a:r>
+              <a:rPr lang="it-IT" sz="1800" dirty="0"/>
+              <a:t>Scoperta utilità </a:t>
+            </a:r>
+            <a:r>
+              <a:rPr lang="it-IT" sz="1800" dirty="0" err="1"/>
+              <a:t>mindmap</a:t>
+            </a:r>
+            <a:r>
+              <a:rPr lang="it-IT" sz="1800" dirty="0"/>
+              <a:t> all’interno di progetti ed idee</a:t>
+            </a:r>
+          </a:p>
+          <a:p>
+            <a:pPr marL="285750" indent="-285750">
+              <a:buFont typeface="Arial" panose="020B0604020202020204" pitchFamily="34" charset="0"/>
+              <a:buChar char="•"/>
+            </a:pPr>
+            <a:endParaRPr lang="it-IT" sz="1800" dirty="0"/>
+          </a:p>
+          <a:p>
+            <a:pPr marL="285750" indent="-285750">
+              <a:buFont typeface="Arial" panose="020B0604020202020204" pitchFamily="34" charset="0"/>
+              <a:buChar char="•"/>
+            </a:pPr>
+            <a:r>
+              <a:rPr lang="it-IT" sz="1800" dirty="0"/>
+              <a:t>Sviluppi futuri: </a:t>
+            </a:r>
+          </a:p>
+          <a:p>
+            <a:pPr lvl="1" indent="0">
+              <a:buNone/>
+            </a:pPr>
+            <a:r>
+              <a:rPr lang="it-IT" sz="1800" dirty="0"/>
+              <a:t>- </a:t>
+            </a:r>
+            <a:r>
+              <a:rPr lang="it-IT" sz="1400" dirty="0"/>
+              <a:t>Aggiungere la possibilità di salvare il proprio lavoro su </a:t>
+            </a:r>
+            <a:r>
+              <a:rPr lang="it-IT" sz="1400" dirty="0" err="1"/>
+              <a:t>Dropbox</a:t>
+            </a:r>
+            <a:r>
+              <a:rPr lang="it-IT" sz="1400" dirty="0"/>
+              <a:t> e Google Drive</a:t>
+            </a:r>
+          </a:p>
+          <a:p>
+            <a:pPr lvl="1"/>
+            <a:endParaRPr lang="it-IT" sz="1200" dirty="0"/>
+          </a:p>
+          <a:p>
+            <a:pPr lvl="1" indent="0">
+              <a:buNone/>
+            </a:pPr>
+            <a:r>
+              <a:rPr lang="it-IT" sz="1800" dirty="0"/>
+              <a:t>- </a:t>
+            </a:r>
+            <a:r>
+              <a:rPr lang="it-IT" sz="1400" dirty="0"/>
+              <a:t>Aggiungere la possibilità di registrarsi per personalizzare l’esperienza di ogni utente</a:t>
+            </a:r>
+          </a:p>
+          <a:p>
+            <a:endParaRPr lang="it-IT" dirty="0"/>
+          </a:p>
+          <a:p>
+            <a:pPr marL="285750" indent="-285750">
+              <a:buFont typeface="Arial" panose="020B0604020202020204" pitchFamily="34" charset="0"/>
+              <a:buChar char="•"/>
+            </a:pPr>
+            <a:endParaRPr lang="it-IT" sz="1800" dirty="0"/>
+          </a:p>
+          <a:p>
+            <a:pPr marL="285750" indent="-285750">
+              <a:buFont typeface="Arial" panose="020B0604020202020204" pitchFamily="34" charset="0"/>
+              <a:buChar char="•"/>
+            </a:pPr>
+            <a:endParaRPr lang="it-IT" sz="1800" dirty="0"/>
+          </a:p>
+          <a:p>
+            <a:pPr marL="285750" indent="-285750">
+              <a:buFont typeface="Arial" panose="020B0604020202020204" pitchFamily="34" charset="0"/>
+              <a:buChar char="•"/>
+            </a:pPr>
+            <a:endParaRPr lang="it-IT" sz="1800" dirty="0"/>
+          </a:p>
+          <a:p>
+            <a:pPr marL="285750" indent="-285750">
+              <a:buFont typeface="Arial" panose="020B0604020202020204" pitchFamily="34" charset="0"/>
+              <a:buChar char="•"/>
+            </a:pPr>
+            <a:endParaRPr lang="it-IT" sz="1800" dirty="0"/>
+          </a:p>
+        </p:txBody>
+      </p:sp>
+      <p:sp>
+        <p:nvSpPr>
+          <p:cNvPr id="3" name="Segnaposto testo 2"/>
+          <p:cNvSpPr>
+            <a:spLocks noGrp="1"/>
+          </p:cNvSpPr>
+          <p:nvPr>
+            <p:ph type="body" sz="quarter" idx="14"/>
+          </p:nvPr>
+        </p:nvSpPr>
+        <p:spPr/>
+        <p:txBody>
+          <a:bodyPr/>
+          <a:lstStyle/>
+          <a:p>
+            <a:r>
+              <a:rPr lang="it-IT" dirty="0"/>
+              <a:t>Conclusioni</a:t>
+            </a:r>
+          </a:p>
+        </p:txBody>
+      </p:sp>
+      <p:pic>
+        <p:nvPicPr>
+          <p:cNvPr id="5" name="Immagine 4" descr="Immagine che contiene clipart&#10;&#10;Descrizione generata automaticamente">
+            <a:extLst>
+              <a:ext uri="{FF2B5EF4-FFF2-40B4-BE49-F238E27FC236}">
+                <a16:creationId xmlns:a16="http://schemas.microsoft.com/office/drawing/2014/main" id="{5BB63B31-7768-E643-89C1-1C8CCD09C12E}"/>
+              </a:ext>
+            </a:extLst>
+          </p:cNvPr>
+          <p:cNvPicPr>
+            <a:picLocks noChangeAspect="1"/>
+          </p:cNvPicPr>
+          <p:nvPr/>
+        </p:nvPicPr>
+        <p:blipFill>
+          <a:blip r:embed="rId3"/>
+          <a:stretch>
+            <a:fillRect/>
+          </a:stretch>
+        </p:blipFill>
+        <p:spPr>
+          <a:xfrm>
+            <a:off x="7126932" y="1203725"/>
+            <a:ext cx="1333500" cy="1511300"/>
+          </a:xfrm>
+          <a:prstGeom prst="rect">
+            <a:avLst/>
+          </a:prstGeom>
+        </p:spPr>
+      </p:pic>
+    </p:spTree>
+    <p:extLst>
+      <p:ext uri="{BB962C8B-B14F-4D97-AF65-F5344CB8AC3E}">
+        <p14:creationId xmlns:p14="http://schemas.microsoft.com/office/powerpoint/2010/main" val="301514018"/>
+      </p:ext>
+    </p:extLst>
+  </p:cSld>
+  <p:clrMapOvr>
+    <a:masterClrMapping/>
+  </p:clrMapOvr>
+</p:sld>
+</file>
+
+<file path=ppt/slides/slide11.xml><?xml version="1.0" encoding="utf-8"?>
+<p:sld xmlns:a="http://schemas.openxmlformats.org/drawingml/2006/main" xmlns:r="http://schemas.openxmlformats.org/officeDocument/2006/relationships" xmlns:p="http://schemas.openxmlformats.org/presentationml/2006/main">
+  <p:cSld>
+    <p:spTree>
+      <p:nvGrpSpPr>
+        <p:cNvPr id="1" name=""/>
+        <p:cNvGrpSpPr/>
+        <p:nvPr/>
+      </p:nvGrpSpPr>
+      <p:grpSpPr>
+        <a:xfrm>
+          <a:off x="0" y="0"/>
+          <a:ext cx="0" cy="0"/>
+          <a:chOff x="0" y="0"/>
+          <a:chExt cx="0" cy="0"/>
+        </a:xfrm>
+      </p:grpSpPr>
+      <p:sp>
+        <p:nvSpPr>
           <p:cNvPr id="2" name="Segnaposto testo 1">
             <a:extLst>
               <a:ext uri="{FF2B5EF4-FFF2-40B4-BE49-F238E27FC236}">
@@ -5606,8 +5997,8 @@
         </p:nvSpPr>
         <p:spPr>
           <a:xfrm>
-            <a:off x="323528" y="2996952"/>
-            <a:ext cx="7992888" cy="3579192"/>
+            <a:off x="323528" y="3573016"/>
+            <a:ext cx="7992888" cy="3003128"/>
           </a:xfrm>
         </p:spPr>
         <p:txBody>
@@ -5622,6 +6013,36 @@
           </a:p>
         </p:txBody>
       </p:sp>
+      <p:pic>
+        <p:nvPicPr>
+          <p:cNvPr id="9" name="Immagine 8">
+            <a:extLst>
+              <a:ext uri="{FF2B5EF4-FFF2-40B4-BE49-F238E27FC236}">
+                <a16:creationId xmlns:a16="http://schemas.microsoft.com/office/drawing/2014/main" id="{2D503BCF-FE37-9A4B-B6BC-AB0475524DA7}"/>
+              </a:ext>
+            </a:extLst>
+          </p:cNvPr>
+          <p:cNvPicPr>
+            <a:picLocks noChangeAspect="1"/>
+          </p:cNvPicPr>
+          <p:nvPr/>
+        </p:nvPicPr>
+        <p:blipFill>
+          <a:blip r:embed="rId2"/>
+          <a:stretch>
+            <a:fillRect/>
+          </a:stretch>
+        </p:blipFill>
+        <p:spPr>
+          <a:xfrm>
+            <a:off x="3455876" y="1844824"/>
+            <a:ext cx="1728192" cy="1728192"/>
+          </a:xfrm>
+          <a:prstGeom prst="rect">
+            <a:avLst/>
+          </a:prstGeom>
+        </p:spPr>
+      </p:pic>
     </p:spTree>
     <p:extLst>
       <p:ext uri="{BB962C8B-B14F-4D97-AF65-F5344CB8AC3E}">
@@ -5678,7 +6099,7 @@
             </a:pPr>
             <a:r>
               <a:rPr lang="it-IT" sz="1800" dirty="0"/>
-              <a:t>Analizzare funzionamento delle </a:t>
+              <a:t>Analizzare funzionamento </a:t>
             </a:r>
             <a:r>
               <a:rPr lang="it-IT" sz="1800" dirty="0" err="1"/>
@@ -5942,6 +6363,41 @@
           </a:p>
         </p:txBody>
       </p:sp>
+      <p:pic>
+        <p:nvPicPr>
+          <p:cNvPr id="4" name="Immagine 3" descr="Immagine che contiene screenshot&#10;&#10;Descrizione generata automaticamente">
+            <a:extLst>
+              <a:ext uri="{FF2B5EF4-FFF2-40B4-BE49-F238E27FC236}">
+                <a16:creationId xmlns:a16="http://schemas.microsoft.com/office/drawing/2014/main" id="{35FA4F92-B899-484D-95BF-5B216A6A1C7F}"/>
+              </a:ext>
+            </a:extLst>
+          </p:cNvPr>
+          <p:cNvPicPr>
+            <a:picLocks noChangeAspect="1"/>
+          </p:cNvPicPr>
+          <p:nvPr/>
+        </p:nvPicPr>
+        <p:blipFill>
+          <a:blip r:embed="rId2"/>
+          <a:stretch>
+            <a:fillRect/>
+          </a:stretch>
+        </p:blipFill>
+        <p:spPr>
+          <a:xfrm>
+            <a:off x="4139952" y="4005064"/>
+            <a:ext cx="4174582" cy="2269171"/>
+          </a:xfrm>
+          <a:prstGeom prst="rect">
+            <a:avLst/>
+          </a:prstGeom>
+          <a:ln w="12700">
+            <a:solidFill>
+              <a:schemeClr val="tx1"/>
+            </a:solidFill>
+          </a:ln>
+        </p:spPr>
+      </p:pic>
     </p:spTree>
     <p:extLst>
       <p:ext uri="{BB962C8B-B14F-4D97-AF65-F5344CB8AC3E}">
@@ -5974,6 +6430,86 @@
       </p:grpSpPr>
       <p:sp>
         <p:nvSpPr>
+          <p:cNvPr id="2" name="Segnaposto testo 1"/>
+          <p:cNvSpPr>
+            <a:spLocks noGrp="1"/>
+          </p:cNvSpPr>
+          <p:nvPr>
+            <p:ph type="body" sz="quarter" idx="13"/>
+          </p:nvPr>
+        </p:nvSpPr>
+        <p:spPr>
+          <a:xfrm>
+            <a:off x="323528" y="2314972"/>
+            <a:ext cx="8136904" cy="4248472"/>
+          </a:xfrm>
+        </p:spPr>
+        <p:txBody>
+          <a:bodyPr/>
+          <a:lstStyle/>
+          <a:p>
+            <a:pPr marL="285750" indent="-285750">
+              <a:buFont typeface="Arial" panose="020B0604020202020204" pitchFamily="34" charset="0"/>
+              <a:buChar char="•"/>
+            </a:pPr>
+            <a:r>
+              <a:rPr lang="it-IT" sz="1800" dirty="0"/>
+              <a:t>Analisi </a:t>
+            </a:r>
+            <a:r>
+              <a:rPr lang="it-IT" sz="1800" dirty="0" err="1"/>
+              <a:t>draw.io</a:t>
+            </a:r>
+            <a:endParaRPr lang="it-IT" sz="2800" dirty="0"/>
+          </a:p>
+          <a:p>
+            <a:pPr marL="285750" indent="-285750">
+              <a:buFont typeface="Arial" panose="020B0604020202020204" pitchFamily="34" charset="0"/>
+              <a:buChar char="•"/>
+            </a:pPr>
+            <a:endParaRPr lang="it-IT" sz="1800" dirty="0"/>
+          </a:p>
+          <a:p>
+            <a:pPr marL="285750" indent="-285750">
+              <a:buFont typeface="Arial" panose="020B0604020202020204" pitchFamily="34" charset="0"/>
+              <a:buChar char="•"/>
+            </a:pPr>
+            <a:r>
+              <a:rPr lang="it-IT" sz="1800" dirty="0"/>
+              <a:t>Analisi </a:t>
+            </a:r>
+            <a:r>
+              <a:rPr lang="it-IT" sz="1800" dirty="0" err="1"/>
+              <a:t>mindmup</a:t>
+            </a:r>
+            <a:endParaRPr lang="it-IT" sz="1800" dirty="0"/>
+          </a:p>
+          <a:p>
+            <a:pPr marL="285750" indent="-285750">
+              <a:buFont typeface="Arial" panose="020B0604020202020204" pitchFamily="34" charset="0"/>
+              <a:buChar char="•"/>
+            </a:pPr>
+            <a:endParaRPr lang="it-IT" sz="1800" dirty="0"/>
+          </a:p>
+          <a:p>
+            <a:pPr marL="285750" indent="-285750">
+              <a:buFont typeface="Arial" panose="020B0604020202020204" pitchFamily="34" charset="0"/>
+              <a:buChar char="•"/>
+            </a:pPr>
+            <a:r>
+              <a:rPr lang="it-IT" sz="1800" dirty="0"/>
+              <a:t>Analisi </a:t>
+            </a:r>
+            <a:r>
+              <a:rPr lang="it-IT" sz="1800" dirty="0" err="1"/>
+              <a:t>iMindMap</a:t>
+            </a:r>
+            <a:endParaRPr lang="it-IT" sz="1800" dirty="0"/>
+          </a:p>
+        </p:txBody>
+      </p:sp>
+      <p:sp>
+        <p:nvSpPr>
           <p:cNvPr id="3" name="Segnaposto testo 2"/>
           <p:cNvSpPr>
             <a:spLocks noGrp="1"/>
@@ -5989,55 +6525,15 @@
           <a:p>
             <a:r>
               <a:rPr lang="it-IT" dirty="0"/>
-              <a:t>Esempio </a:t>
-            </a:r>
-            <a:r>
-              <a:rPr lang="it-IT" dirty="0" err="1"/>
-              <a:t>Mindmap</a:t>
-            </a:r>
-            <a:endParaRPr lang="it-IT" dirty="0"/>
+              <a:t>Analisi alternative presenti sul mercato </a:t>
+            </a:r>
           </a:p>
         </p:txBody>
       </p:sp>
-      <p:pic>
-        <p:nvPicPr>
-          <p:cNvPr id="7" name="Immagine 6" descr="Immagine che contiene screenshot&#10;&#10;Descrizione generata automaticamente">
-            <a:extLst>
-              <a:ext uri="{FF2B5EF4-FFF2-40B4-BE49-F238E27FC236}">
-                <a16:creationId xmlns:a16="http://schemas.microsoft.com/office/drawing/2014/main" id="{225F810F-7674-534B-8494-7D2C2FFB0393}"/>
-              </a:ext>
-            </a:extLst>
-          </p:cNvPr>
-          <p:cNvPicPr>
-            <a:picLocks noChangeAspect="1"/>
-          </p:cNvPicPr>
-          <p:nvPr/>
-        </p:nvPicPr>
-        <p:blipFill>
-          <a:blip r:embed="rId2"/>
-          <a:stretch>
-            <a:fillRect/>
-          </a:stretch>
-        </p:blipFill>
-        <p:spPr>
-          <a:xfrm>
-            <a:off x="504764" y="1916832"/>
-            <a:ext cx="7486400" cy="4069371"/>
-          </a:xfrm>
-          <a:prstGeom prst="rect">
-            <a:avLst/>
-          </a:prstGeom>
-          <a:ln w="12700">
-            <a:solidFill>
-              <a:schemeClr val="tx1"/>
-            </a:solidFill>
-          </a:ln>
-        </p:spPr>
-      </p:pic>
     </p:spTree>
     <p:extLst>
       <p:ext uri="{BB962C8B-B14F-4D97-AF65-F5344CB8AC3E}">
-        <p14:creationId xmlns:p14="http://schemas.microsoft.com/office/powerpoint/2010/main" val="3357230377"/>
+        <p14:creationId xmlns:p14="http://schemas.microsoft.com/office/powerpoint/2010/main" val="2247490896"/>
       </p:ext>
     </p:extLst>
   </p:cSld>

</xml_diff>